<commit_message>
docs almost done, time to run DT custom lib of multiple minerals
</commit_message>
<xml_diff>
--- a/Vincent/Excel_analyze/Vincent_done8.22.pptx
+++ b/Vincent/Excel_analyze/Vincent_done8.22.pptx
@@ -9,12 +9,13 @@
     <p:sldId id="257" r:id="rId3"/>
     <p:sldId id="259" r:id="rId4"/>
     <p:sldId id="264" r:id="rId5"/>
-    <p:sldId id="265" r:id="rId6"/>
+    <p:sldId id="272" r:id="rId6"/>
     <p:sldId id="266" r:id="rId7"/>
     <p:sldId id="267" r:id="rId8"/>
     <p:sldId id="260" r:id="rId9"/>
     <p:sldId id="270" r:id="rId10"/>
-    <p:sldId id="271" r:id="rId11"/>
+    <p:sldId id="273" r:id="rId11"/>
+    <p:sldId id="271" r:id="rId12"/>
   </p:sldIdLst>
   <p:sldSz cx="12192000" cy="6858000"/>
   <p:notesSz cx="6858000" cy="9144000"/>
@@ -665,11 +666,11 @@
           <c:showPercent val="0"/>
           <c:showBubbleSize val="0"/>
         </c:dLbls>
-        <c:axId val="489765248"/>
-        <c:axId val="489767208"/>
+        <c:axId val="316423872"/>
+        <c:axId val="317708480"/>
       </c:scatterChart>
       <c:valAx>
-        <c:axId val="489765248"/>
+        <c:axId val="316423872"/>
         <c:scaling>
           <c:orientation val="minMax"/>
         </c:scaling>
@@ -726,12 +727,12 @@
             <a:endParaRPr lang="zh-CN"/>
           </a:p>
         </c:txPr>
-        <c:crossAx val="489767208"/>
+        <c:crossAx val="317708480"/>
         <c:crosses val="autoZero"/>
         <c:crossBetween val="midCat"/>
       </c:valAx>
       <c:valAx>
-        <c:axId val="489767208"/>
+        <c:axId val="317708480"/>
         <c:scaling>
           <c:orientation val="minMax"/>
         </c:scaling>
@@ -788,7 +789,7 @@
             <a:endParaRPr lang="zh-CN"/>
           </a:p>
         </c:txPr>
-        <c:crossAx val="489765248"/>
+        <c:crossAx val="316423872"/>
         <c:crosses val="autoZero"/>
         <c:crossBetween val="midCat"/>
       </c:valAx>
@@ -1004,11 +1005,11 @@
           <c:showPercent val="0"/>
           <c:showBubbleSize val="0"/>
         </c:dLbls>
-        <c:axId val="486437648"/>
-        <c:axId val="486436080"/>
+        <c:axId val="249931472"/>
+        <c:axId val="249931864"/>
       </c:scatterChart>
       <c:valAx>
-        <c:axId val="486437648"/>
+        <c:axId val="249931472"/>
         <c:scaling>
           <c:orientation val="minMax"/>
         </c:scaling>
@@ -1065,12 +1066,12 @@
             <a:endParaRPr lang="zh-CN"/>
           </a:p>
         </c:txPr>
-        <c:crossAx val="486436080"/>
+        <c:crossAx val="249931864"/>
         <c:crosses val="autoZero"/>
         <c:crossBetween val="midCat"/>
       </c:valAx>
       <c:valAx>
-        <c:axId val="486436080"/>
+        <c:axId val="249931864"/>
         <c:scaling>
           <c:orientation val="minMax"/>
         </c:scaling>
@@ -1127,7 +1128,7 @@
             <a:endParaRPr lang="zh-CN"/>
           </a:p>
         </c:txPr>
-        <c:crossAx val="486437648"/>
+        <c:crossAx val="249931472"/>
         <c:crosses val="autoZero"/>
         <c:crossBetween val="midCat"/>
       </c:valAx>
@@ -1392,11 +1393,11 @@
           <c:showPercent val="0"/>
           <c:showBubbleSize val="0"/>
         </c:dLbls>
-        <c:axId val="243041328"/>
-        <c:axId val="243038584"/>
+        <c:axId val="249929904"/>
+        <c:axId val="249930688"/>
       </c:scatterChart>
       <c:valAx>
-        <c:axId val="243041328"/>
+        <c:axId val="249929904"/>
         <c:scaling>
           <c:orientation val="minMax"/>
         </c:scaling>
@@ -1453,12 +1454,12 @@
             <a:endParaRPr lang="zh-CN"/>
           </a:p>
         </c:txPr>
-        <c:crossAx val="243038584"/>
+        <c:crossAx val="249930688"/>
         <c:crosses val="autoZero"/>
         <c:crossBetween val="midCat"/>
       </c:valAx>
       <c:valAx>
-        <c:axId val="243038584"/>
+        <c:axId val="249930688"/>
         <c:scaling>
           <c:orientation val="minMax"/>
         </c:scaling>
@@ -1515,7 +1516,7 @@
             <a:endParaRPr lang="zh-CN"/>
           </a:p>
         </c:txPr>
-        <c:crossAx val="243041328"/>
+        <c:crossAx val="249929904"/>
         <c:crosses val="autoZero"/>
         <c:crossBetween val="midCat"/>
       </c:valAx>
@@ -3400,7 +3401,7 @@
           <a:p>
             <a:fld id="{41D0407E-9CDF-4CCE-8109-3751B4E16E75}" type="datetimeFigureOut">
               <a:rPr lang="zh-CN" altLang="en-US" smtClean="0"/>
-              <a:t>2017/8/22</a:t>
+              <a:t>2017/8/25</a:t>
             </a:fld>
             <a:endParaRPr lang="zh-CN" altLang="en-US"/>
           </a:p>
@@ -3570,7 +3571,7 @@
           <a:p>
             <a:fld id="{41D0407E-9CDF-4CCE-8109-3751B4E16E75}" type="datetimeFigureOut">
               <a:rPr lang="zh-CN" altLang="en-US" smtClean="0"/>
-              <a:t>2017/8/22</a:t>
+              <a:t>2017/8/25</a:t>
             </a:fld>
             <a:endParaRPr lang="zh-CN" altLang="en-US"/>
           </a:p>
@@ -3750,7 +3751,7 @@
           <a:p>
             <a:fld id="{41D0407E-9CDF-4CCE-8109-3751B4E16E75}" type="datetimeFigureOut">
               <a:rPr lang="zh-CN" altLang="en-US" smtClean="0"/>
-              <a:t>2017/8/22</a:t>
+              <a:t>2017/8/25</a:t>
             </a:fld>
             <a:endParaRPr lang="zh-CN" altLang="en-US"/>
           </a:p>
@@ -3920,7 +3921,7 @@
           <a:p>
             <a:fld id="{41D0407E-9CDF-4CCE-8109-3751B4E16E75}" type="datetimeFigureOut">
               <a:rPr lang="zh-CN" altLang="en-US" smtClean="0"/>
-              <a:t>2017/8/22</a:t>
+              <a:t>2017/8/25</a:t>
             </a:fld>
             <a:endParaRPr lang="zh-CN" altLang="en-US"/>
           </a:p>
@@ -4166,7 +4167,7 @@
           <a:p>
             <a:fld id="{41D0407E-9CDF-4CCE-8109-3751B4E16E75}" type="datetimeFigureOut">
               <a:rPr lang="zh-CN" altLang="en-US" smtClean="0"/>
-              <a:t>2017/8/22</a:t>
+              <a:t>2017/8/25</a:t>
             </a:fld>
             <a:endParaRPr lang="zh-CN" altLang="en-US"/>
           </a:p>
@@ -4398,7 +4399,7 @@
           <a:p>
             <a:fld id="{41D0407E-9CDF-4CCE-8109-3751B4E16E75}" type="datetimeFigureOut">
               <a:rPr lang="zh-CN" altLang="en-US" smtClean="0"/>
-              <a:t>2017/8/22</a:t>
+              <a:t>2017/8/25</a:t>
             </a:fld>
             <a:endParaRPr lang="zh-CN" altLang="en-US"/>
           </a:p>
@@ -4765,7 +4766,7 @@
           <a:p>
             <a:fld id="{41D0407E-9CDF-4CCE-8109-3751B4E16E75}" type="datetimeFigureOut">
               <a:rPr lang="zh-CN" altLang="en-US" smtClean="0"/>
-              <a:t>2017/8/22</a:t>
+              <a:t>2017/8/25</a:t>
             </a:fld>
             <a:endParaRPr lang="zh-CN" altLang="en-US"/>
           </a:p>
@@ -4883,7 +4884,7 @@
           <a:p>
             <a:fld id="{41D0407E-9CDF-4CCE-8109-3751B4E16E75}" type="datetimeFigureOut">
               <a:rPr lang="zh-CN" altLang="en-US" smtClean="0"/>
-              <a:t>2017/8/22</a:t>
+              <a:t>2017/8/25</a:t>
             </a:fld>
             <a:endParaRPr lang="zh-CN" altLang="en-US"/>
           </a:p>
@@ -4978,7 +4979,7 @@
           <a:p>
             <a:fld id="{41D0407E-9CDF-4CCE-8109-3751B4E16E75}" type="datetimeFigureOut">
               <a:rPr lang="zh-CN" altLang="en-US" smtClean="0"/>
-              <a:t>2017/8/22</a:t>
+              <a:t>2017/8/25</a:t>
             </a:fld>
             <a:endParaRPr lang="zh-CN" altLang="en-US"/>
           </a:p>
@@ -5255,7 +5256,7 @@
           <a:p>
             <a:fld id="{41D0407E-9CDF-4CCE-8109-3751B4E16E75}" type="datetimeFigureOut">
               <a:rPr lang="zh-CN" altLang="en-US" smtClean="0"/>
-              <a:t>2017/8/22</a:t>
+              <a:t>2017/8/25</a:t>
             </a:fld>
             <a:endParaRPr lang="zh-CN" altLang="en-US"/>
           </a:p>
@@ -5508,7 +5509,7 @@
           <a:p>
             <a:fld id="{41D0407E-9CDF-4CCE-8109-3751B4E16E75}" type="datetimeFigureOut">
               <a:rPr lang="zh-CN" altLang="en-US" smtClean="0"/>
-              <a:t>2017/8/22</a:t>
+              <a:t>2017/8/25</a:t>
             </a:fld>
             <a:endParaRPr lang="zh-CN" altLang="en-US"/>
           </a:p>
@@ -5721,7 +5722,7 @@
           <a:p>
             <a:fld id="{41D0407E-9CDF-4CCE-8109-3751B4E16E75}" type="datetimeFigureOut">
               <a:rPr lang="zh-CN" altLang="en-US" smtClean="0"/>
-              <a:t>2017/8/22</a:t>
+              <a:t>2017/8/25</a:t>
             </a:fld>
             <a:endParaRPr lang="zh-CN" altLang="en-US"/>
           </a:p>
@@ -6445,6 +6446,1004 @@
       </p:grpSpPr>
       <p:sp>
         <p:nvSpPr>
+          <p:cNvPr id="2" name="Title 1"/>
+          <p:cNvSpPr>
+            <a:spLocks noGrp="1"/>
+          </p:cNvSpPr>
+          <p:nvPr>
+            <p:ph type="title"/>
+          </p:nvPr>
+        </p:nvSpPr>
+        <p:spPr/>
+        <p:txBody>
+          <a:bodyPr/>
+          <a:lstStyle/>
+          <a:p>
+            <a:endParaRPr lang="zh-CN" altLang="en-US"/>
+          </a:p>
+        </p:txBody>
+      </p:sp>
+      <p:graphicFrame>
+        <p:nvGraphicFramePr>
+          <p:cNvPr id="4" name="Content Placeholder 3"/>
+          <p:cNvGraphicFramePr>
+            <a:graphicFrameLocks noGrp="1"/>
+          </p:cNvGraphicFramePr>
+          <p:nvPr>
+            <p:ph idx="1"/>
+            <p:extLst>
+              <p:ext uri="{D42A27DB-BD31-4B8C-83A1-F6EECF244321}">
+                <p14:modId xmlns:p14="http://schemas.microsoft.com/office/powerpoint/2010/main" val="2944375550"/>
+              </p:ext>
+            </p:extLst>
+          </p:nvPr>
+        </p:nvGraphicFramePr>
+        <p:xfrm>
+          <a:off x="1159098" y="2266681"/>
+          <a:ext cx="10194701" cy="3657600"/>
+        </p:xfrm>
+        <a:graphic>
+          <a:graphicData uri="http://schemas.openxmlformats.org/drawingml/2006/table">
+            <a:tbl>
+              <a:tblPr firstRow="1" bandRow="1">
+                <a:tableStyleId>{5C22544A-7EE6-4342-B048-85BDC9FD1C3A}</a:tableStyleId>
+              </a:tblPr>
+              <a:tblGrid>
+                <a:gridCol w="1971725"/>
+                <a:gridCol w="3125626"/>
+                <a:gridCol w="2548675"/>
+                <a:gridCol w="2548675"/>
+              </a:tblGrid>
+              <a:tr h="326734">
+                <a:tc>
+                  <a:txBody>
+                    <a:bodyPr/>
+                    <a:lstStyle/>
+                    <a:p>
+                      <a:r>
+                        <a:rPr lang="en-US" altLang="zh-CN" dirty="0" smtClean="0"/>
+                        <a:t>Weight/R-Squared</a:t>
+                      </a:r>
+                      <a:endParaRPr lang="zh-CN" altLang="en-US" dirty="0"/>
+                    </a:p>
+                  </a:txBody>
+                  <a:tcPr/>
+                </a:tc>
+                <a:tc>
+                  <a:txBody>
+                    <a:bodyPr/>
+                    <a:lstStyle/>
+                    <a:p>
+                      <a:pPr algn="ctr"/>
+                      <a:r>
+                        <a:rPr lang="en-US" altLang="zh-CN" dirty="0" smtClean="0"/>
+                        <a:t>Band1(705-769)</a:t>
+                      </a:r>
+                      <a:endParaRPr lang="zh-CN" altLang="en-US" dirty="0"/>
+                    </a:p>
+                  </a:txBody>
+                  <a:tcPr/>
+                </a:tc>
+                <a:tc>
+                  <a:txBody>
+                    <a:bodyPr/>
+                    <a:lstStyle/>
+                    <a:p>
+                      <a:pPr algn="ctr"/>
+                      <a:r>
+                        <a:rPr lang="en-US" altLang="zh-CN" dirty="0" smtClean="0"/>
+                        <a:t>Band2(770-832)</a:t>
+                      </a:r>
+                      <a:endParaRPr lang="zh-CN" altLang="en-US" dirty="0"/>
+                    </a:p>
+                  </a:txBody>
+                  <a:tcPr/>
+                </a:tc>
+                <a:tc>
+                  <a:txBody>
+                    <a:bodyPr/>
+                    <a:lstStyle/>
+                    <a:p>
+                      <a:pPr algn="ctr"/>
+                      <a:r>
+                        <a:rPr lang="en-US" altLang="zh-CN" dirty="0" smtClean="0"/>
+                        <a:t>Band3(854-879)</a:t>
+                      </a:r>
+                      <a:endParaRPr lang="zh-CN" altLang="en-US" dirty="0"/>
+                    </a:p>
+                  </a:txBody>
+                  <a:tcPr/>
+                </a:tc>
+              </a:tr>
+              <a:tr h="326734">
+                <a:tc>
+                  <a:txBody>
+                    <a:bodyPr/>
+                    <a:lstStyle/>
+                    <a:p>
+                      <a:pPr algn="ctr"/>
+                      <a:r>
+                        <a:rPr lang="en-US" altLang="zh-CN" sz="1800" kern="1200" dirty="0" smtClean="0">
+                          <a:solidFill>
+                            <a:schemeClr val="dk1"/>
+                          </a:solidFill>
+                          <a:latin typeface="+mn-lt"/>
+                          <a:ea typeface="+mn-ea"/>
+                          <a:cs typeface="+mn-cs"/>
+                        </a:rPr>
+                        <a:t>0.2</a:t>
+                      </a:r>
+                      <a:endParaRPr lang="zh-CN" altLang="en-US" sz="1800" kern="1200" dirty="0">
+                        <a:solidFill>
+                          <a:schemeClr val="dk1"/>
+                        </a:solidFill>
+                        <a:latin typeface="+mn-lt"/>
+                        <a:ea typeface="+mn-ea"/>
+                        <a:cs typeface="+mn-cs"/>
+                      </a:endParaRPr>
+                    </a:p>
+                  </a:txBody>
+                  <a:tcPr/>
+                </a:tc>
+                <a:tc>
+                  <a:txBody>
+                    <a:bodyPr/>
+                    <a:lstStyle/>
+                    <a:p>
+                      <a:pPr algn="ctr" fontAlgn="ctr"/>
+                      <a:r>
+                        <a:rPr lang="en-US" altLang="zh-CN" sz="1800" kern="1200" dirty="0">
+                          <a:solidFill>
+                            <a:schemeClr val="dk1"/>
+                          </a:solidFill>
+                          <a:latin typeface="+mn-lt"/>
+                          <a:ea typeface="+mn-ea"/>
+                          <a:cs typeface="+mn-cs"/>
+                        </a:rPr>
+                        <a:t>0.91216</a:t>
+                      </a:r>
+                    </a:p>
+                  </a:txBody>
+                  <a:tcPr marL="9525" marR="9525" marT="9525" marB="0" anchor="ctr"/>
+                </a:tc>
+                <a:tc>
+                  <a:txBody>
+                    <a:bodyPr/>
+                    <a:lstStyle/>
+                    <a:p>
+                      <a:pPr algn="ctr" fontAlgn="ctr"/>
+                      <a:r>
+                        <a:rPr lang="en-US" altLang="zh-CN" sz="1800" kern="1200" dirty="0">
+                          <a:solidFill>
+                            <a:schemeClr val="dk1"/>
+                          </a:solidFill>
+                          <a:latin typeface="+mn-lt"/>
+                          <a:ea typeface="+mn-ea"/>
+                          <a:cs typeface="+mn-cs"/>
+                        </a:rPr>
+                        <a:t>0.071895</a:t>
+                      </a:r>
+                    </a:p>
+                  </a:txBody>
+                  <a:tcPr marL="9525" marR="9525" marT="9525" marB="0" anchor="ctr"/>
+                </a:tc>
+                <a:tc>
+                  <a:txBody>
+                    <a:bodyPr/>
+                    <a:lstStyle/>
+                    <a:p>
+                      <a:pPr algn="ctr" fontAlgn="ctr"/>
+                      <a:r>
+                        <a:rPr lang="en-US" altLang="zh-CN" sz="1800" kern="1200" dirty="0">
+                          <a:solidFill>
+                            <a:schemeClr val="dk1"/>
+                          </a:solidFill>
+                          <a:latin typeface="+mn-lt"/>
+                          <a:ea typeface="+mn-ea"/>
+                          <a:cs typeface="+mn-cs"/>
+                        </a:rPr>
+                        <a:t>0.885929</a:t>
+                      </a:r>
+                    </a:p>
+                  </a:txBody>
+                  <a:tcPr marL="9525" marR="9525" marT="9525" marB="0" anchor="ctr"/>
+                </a:tc>
+              </a:tr>
+              <a:tr h="326734">
+                <a:tc>
+                  <a:txBody>
+                    <a:bodyPr/>
+                    <a:lstStyle/>
+                    <a:p>
+                      <a:pPr algn="ctr"/>
+                      <a:r>
+                        <a:rPr lang="en-US" altLang="zh-CN" sz="1800" kern="1200" dirty="0" smtClean="0">
+                          <a:solidFill>
+                            <a:schemeClr val="dk1"/>
+                          </a:solidFill>
+                          <a:latin typeface="+mn-lt"/>
+                          <a:ea typeface="+mn-ea"/>
+                          <a:cs typeface="+mn-cs"/>
+                        </a:rPr>
+                        <a:t>0.3</a:t>
+                      </a:r>
+                      <a:endParaRPr lang="zh-CN" altLang="en-US" sz="1800" kern="1200" dirty="0">
+                        <a:solidFill>
+                          <a:schemeClr val="dk1"/>
+                        </a:solidFill>
+                        <a:latin typeface="+mn-lt"/>
+                        <a:ea typeface="+mn-ea"/>
+                        <a:cs typeface="+mn-cs"/>
+                      </a:endParaRPr>
+                    </a:p>
+                  </a:txBody>
+                  <a:tcPr/>
+                </a:tc>
+                <a:tc>
+                  <a:txBody>
+                    <a:bodyPr/>
+                    <a:lstStyle/>
+                    <a:p>
+                      <a:pPr algn="ctr" fontAlgn="ctr"/>
+                      <a:r>
+                        <a:rPr lang="en-US" altLang="zh-CN" sz="1800" kern="1200" dirty="0">
+                          <a:solidFill>
+                            <a:schemeClr val="dk1"/>
+                          </a:solidFill>
+                          <a:latin typeface="+mn-lt"/>
+                          <a:ea typeface="+mn-ea"/>
+                          <a:cs typeface="+mn-cs"/>
+                        </a:rPr>
+                        <a:t>0.91416</a:t>
+                      </a:r>
+                    </a:p>
+                  </a:txBody>
+                  <a:tcPr marL="9525" marR="9525" marT="9525" marB="0" anchor="ctr"/>
+                </a:tc>
+                <a:tc>
+                  <a:txBody>
+                    <a:bodyPr/>
+                    <a:lstStyle/>
+                    <a:p>
+                      <a:pPr algn="ctr" fontAlgn="ctr"/>
+                      <a:r>
+                        <a:rPr lang="en-US" altLang="zh-CN" sz="1800" kern="1200" dirty="0">
+                          <a:solidFill>
+                            <a:schemeClr val="dk1"/>
+                          </a:solidFill>
+                          <a:latin typeface="+mn-lt"/>
+                          <a:ea typeface="+mn-ea"/>
+                          <a:cs typeface="+mn-cs"/>
+                        </a:rPr>
+                        <a:t>0.033532</a:t>
+                      </a:r>
+                    </a:p>
+                  </a:txBody>
+                  <a:tcPr marL="9525" marR="9525" marT="9525" marB="0" anchor="ctr"/>
+                </a:tc>
+                <a:tc>
+                  <a:txBody>
+                    <a:bodyPr/>
+                    <a:lstStyle/>
+                    <a:p>
+                      <a:pPr algn="ctr" fontAlgn="ctr"/>
+                      <a:r>
+                        <a:rPr lang="en-US" altLang="zh-CN" sz="1800" kern="1200">
+                          <a:solidFill>
+                            <a:schemeClr val="dk1"/>
+                          </a:solidFill>
+                          <a:latin typeface="+mn-lt"/>
+                          <a:ea typeface="+mn-ea"/>
+                          <a:cs typeface="+mn-cs"/>
+                        </a:rPr>
+                        <a:t>0.885799</a:t>
+                      </a:r>
+                    </a:p>
+                  </a:txBody>
+                  <a:tcPr marL="9525" marR="9525" marT="9525" marB="0" anchor="ctr"/>
+                </a:tc>
+              </a:tr>
+              <a:tr h="326734">
+                <a:tc>
+                  <a:txBody>
+                    <a:bodyPr/>
+                    <a:lstStyle/>
+                    <a:p>
+                      <a:pPr algn="ctr"/>
+                      <a:r>
+                        <a:rPr lang="en-US" altLang="zh-CN" sz="1800" kern="1200" dirty="0" smtClean="0">
+                          <a:solidFill>
+                            <a:schemeClr val="dk1"/>
+                          </a:solidFill>
+                          <a:latin typeface="+mn-lt"/>
+                          <a:ea typeface="+mn-ea"/>
+                          <a:cs typeface="+mn-cs"/>
+                        </a:rPr>
+                        <a:t>0.4</a:t>
+                      </a:r>
+                      <a:endParaRPr lang="zh-CN" altLang="en-US" sz="1800" kern="1200" dirty="0">
+                        <a:solidFill>
+                          <a:schemeClr val="dk1"/>
+                        </a:solidFill>
+                        <a:latin typeface="+mn-lt"/>
+                        <a:ea typeface="+mn-ea"/>
+                        <a:cs typeface="+mn-cs"/>
+                      </a:endParaRPr>
+                    </a:p>
+                  </a:txBody>
+                  <a:tcPr/>
+                </a:tc>
+                <a:tc>
+                  <a:txBody>
+                    <a:bodyPr/>
+                    <a:lstStyle/>
+                    <a:p>
+                      <a:pPr algn="ctr" fontAlgn="ctr"/>
+                      <a:r>
+                        <a:rPr lang="en-US" altLang="zh-CN" sz="1800" kern="1200" dirty="0">
+                          <a:solidFill>
+                            <a:schemeClr val="dk1"/>
+                          </a:solidFill>
+                          <a:latin typeface="+mn-lt"/>
+                          <a:ea typeface="+mn-ea"/>
+                          <a:cs typeface="+mn-cs"/>
+                        </a:rPr>
+                        <a:t>0.91604</a:t>
+                      </a:r>
+                    </a:p>
+                  </a:txBody>
+                  <a:tcPr marL="9525" marR="9525" marT="9525" marB="0" anchor="ctr"/>
+                </a:tc>
+                <a:tc>
+                  <a:txBody>
+                    <a:bodyPr/>
+                    <a:lstStyle/>
+                    <a:p>
+                      <a:pPr algn="ctr" fontAlgn="ctr"/>
+                      <a:r>
+                        <a:rPr lang="en-US" altLang="zh-CN" sz="1800" kern="1200" dirty="0">
+                          <a:solidFill>
+                            <a:schemeClr val="dk1"/>
+                          </a:solidFill>
+                          <a:latin typeface="+mn-lt"/>
+                          <a:ea typeface="+mn-ea"/>
+                          <a:cs typeface="+mn-cs"/>
+                        </a:rPr>
+                        <a:t>0.032402</a:t>
+                      </a:r>
+                    </a:p>
+                  </a:txBody>
+                  <a:tcPr marL="9525" marR="9525" marT="9525" marB="0" anchor="ctr"/>
+                </a:tc>
+                <a:tc>
+                  <a:txBody>
+                    <a:bodyPr/>
+                    <a:lstStyle/>
+                    <a:p>
+                      <a:pPr algn="ctr" fontAlgn="ctr"/>
+                      <a:r>
+                        <a:rPr lang="en-US" altLang="zh-CN" sz="1800" kern="1200">
+                          <a:solidFill>
+                            <a:schemeClr val="dk1"/>
+                          </a:solidFill>
+                          <a:latin typeface="+mn-lt"/>
+                          <a:ea typeface="+mn-ea"/>
+                          <a:cs typeface="+mn-cs"/>
+                        </a:rPr>
+                        <a:t>0.885551</a:t>
+                      </a:r>
+                    </a:p>
+                  </a:txBody>
+                  <a:tcPr marL="9525" marR="9525" marT="9525" marB="0" anchor="ctr"/>
+                </a:tc>
+              </a:tr>
+              <a:tr h="326734">
+                <a:tc>
+                  <a:txBody>
+                    <a:bodyPr/>
+                    <a:lstStyle/>
+                    <a:p>
+                      <a:pPr algn="ctr"/>
+                      <a:r>
+                        <a:rPr lang="en-US" altLang="zh-CN" sz="1800" kern="1200" dirty="0" smtClean="0">
+                          <a:solidFill>
+                            <a:schemeClr val="dk1"/>
+                          </a:solidFill>
+                          <a:latin typeface="+mn-lt"/>
+                          <a:ea typeface="+mn-ea"/>
+                          <a:cs typeface="+mn-cs"/>
+                        </a:rPr>
+                        <a:t>0.5</a:t>
+                      </a:r>
+                      <a:endParaRPr lang="zh-CN" altLang="en-US" sz="1800" kern="1200" dirty="0">
+                        <a:solidFill>
+                          <a:schemeClr val="dk1"/>
+                        </a:solidFill>
+                        <a:latin typeface="+mn-lt"/>
+                        <a:ea typeface="+mn-ea"/>
+                        <a:cs typeface="+mn-cs"/>
+                      </a:endParaRPr>
+                    </a:p>
+                  </a:txBody>
+                  <a:tcPr/>
+                </a:tc>
+                <a:tc>
+                  <a:txBody>
+                    <a:bodyPr/>
+                    <a:lstStyle/>
+                    <a:p>
+                      <a:pPr algn="ctr" fontAlgn="ctr"/>
+                      <a:r>
+                        <a:rPr lang="en-US" altLang="zh-CN" sz="1800" kern="1200" dirty="0">
+                          <a:solidFill>
+                            <a:schemeClr val="dk1"/>
+                          </a:solidFill>
+                          <a:latin typeface="+mn-lt"/>
+                          <a:ea typeface="+mn-ea"/>
+                          <a:cs typeface="+mn-cs"/>
+                        </a:rPr>
+                        <a:t>0.917807</a:t>
+                      </a:r>
+                    </a:p>
+                  </a:txBody>
+                  <a:tcPr marL="9525" marR="9525" marT="9525" marB="0" anchor="ctr"/>
+                </a:tc>
+                <a:tc>
+                  <a:txBody>
+                    <a:bodyPr/>
+                    <a:lstStyle/>
+                    <a:p>
+                      <a:pPr algn="ctr" fontAlgn="ctr"/>
+                      <a:r>
+                        <a:rPr lang="en-US" altLang="zh-CN" sz="1800" kern="1200" dirty="0">
+                          <a:solidFill>
+                            <a:schemeClr val="dk1"/>
+                          </a:solidFill>
+                          <a:latin typeface="+mn-lt"/>
+                          <a:ea typeface="+mn-ea"/>
+                          <a:cs typeface="+mn-cs"/>
+                        </a:rPr>
+                        <a:t>0.031371</a:t>
+                      </a:r>
+                    </a:p>
+                  </a:txBody>
+                  <a:tcPr marL="9525" marR="9525" marT="9525" marB="0" anchor="ctr"/>
+                </a:tc>
+                <a:tc>
+                  <a:txBody>
+                    <a:bodyPr/>
+                    <a:lstStyle/>
+                    <a:p>
+                      <a:pPr algn="ctr" fontAlgn="ctr"/>
+                      <a:r>
+                        <a:rPr lang="en-US" altLang="zh-CN" sz="1800" kern="1200" dirty="0">
+                          <a:solidFill>
+                            <a:schemeClr val="dk1"/>
+                          </a:solidFill>
+                          <a:latin typeface="+mn-lt"/>
+                          <a:ea typeface="+mn-ea"/>
+                          <a:cs typeface="+mn-cs"/>
+                        </a:rPr>
+                        <a:t>0.885206</a:t>
+                      </a:r>
+                    </a:p>
+                  </a:txBody>
+                  <a:tcPr marL="9525" marR="9525" marT="9525" marB="0" anchor="ctr"/>
+                </a:tc>
+              </a:tr>
+              <a:tr h="326734">
+                <a:tc>
+                  <a:txBody>
+                    <a:bodyPr/>
+                    <a:lstStyle/>
+                    <a:p>
+                      <a:pPr algn="ctr"/>
+                      <a:r>
+                        <a:rPr lang="en-US" altLang="zh-CN" sz="1800" kern="1200" dirty="0" smtClean="0">
+                          <a:solidFill>
+                            <a:schemeClr val="dk1"/>
+                          </a:solidFill>
+                          <a:latin typeface="+mn-lt"/>
+                          <a:ea typeface="+mn-ea"/>
+                          <a:cs typeface="+mn-cs"/>
+                        </a:rPr>
+                        <a:t>0.6</a:t>
+                      </a:r>
+                      <a:endParaRPr lang="zh-CN" altLang="en-US" sz="1800" kern="1200" dirty="0">
+                        <a:solidFill>
+                          <a:schemeClr val="dk1"/>
+                        </a:solidFill>
+                        <a:latin typeface="+mn-lt"/>
+                        <a:ea typeface="+mn-ea"/>
+                        <a:cs typeface="+mn-cs"/>
+                      </a:endParaRPr>
+                    </a:p>
+                  </a:txBody>
+                  <a:tcPr/>
+                </a:tc>
+                <a:tc>
+                  <a:txBody>
+                    <a:bodyPr/>
+                    <a:lstStyle/>
+                    <a:p>
+                      <a:pPr algn="ctr" fontAlgn="ctr"/>
+                      <a:r>
+                        <a:rPr lang="en-US" altLang="zh-CN" sz="1800" kern="1200" dirty="0">
+                          <a:solidFill>
+                            <a:schemeClr val="dk1"/>
+                          </a:solidFill>
+                          <a:latin typeface="+mn-lt"/>
+                          <a:ea typeface="+mn-ea"/>
+                          <a:cs typeface="+mn-cs"/>
+                        </a:rPr>
+                        <a:t>0.919467</a:t>
+                      </a:r>
+                    </a:p>
+                  </a:txBody>
+                  <a:tcPr marL="9525" marR="9525" marT="9525" marB="0" anchor="ctr"/>
+                </a:tc>
+                <a:tc>
+                  <a:txBody>
+                    <a:bodyPr/>
+                    <a:lstStyle/>
+                    <a:p>
+                      <a:pPr algn="ctr" fontAlgn="ctr"/>
+                      <a:r>
+                        <a:rPr lang="en-US" altLang="zh-CN" sz="1800" kern="1200" dirty="0">
+                          <a:solidFill>
+                            <a:schemeClr val="dk1"/>
+                          </a:solidFill>
+                          <a:latin typeface="+mn-lt"/>
+                          <a:ea typeface="+mn-ea"/>
+                          <a:cs typeface="+mn-cs"/>
+                        </a:rPr>
+                        <a:t>0.017485</a:t>
+                      </a:r>
+                    </a:p>
+                  </a:txBody>
+                  <a:tcPr marL="9525" marR="9525" marT="9525" marB="0" anchor="ctr"/>
+                </a:tc>
+                <a:tc>
+                  <a:txBody>
+                    <a:bodyPr/>
+                    <a:lstStyle/>
+                    <a:p>
+                      <a:pPr algn="ctr" fontAlgn="ctr"/>
+                      <a:r>
+                        <a:rPr lang="en-US" altLang="zh-CN" sz="1800" kern="1200" dirty="0">
+                          <a:solidFill>
+                            <a:schemeClr val="dk1"/>
+                          </a:solidFill>
+                          <a:latin typeface="+mn-lt"/>
+                          <a:ea typeface="+mn-ea"/>
+                          <a:cs typeface="+mn-cs"/>
+                        </a:rPr>
+                        <a:t>0.884784</a:t>
+                      </a:r>
+                    </a:p>
+                  </a:txBody>
+                  <a:tcPr marL="9525" marR="9525" marT="9525" marB="0" anchor="ctr"/>
+                </a:tc>
+              </a:tr>
+              <a:tr h="326734">
+                <a:tc>
+                  <a:txBody>
+                    <a:bodyPr/>
+                    <a:lstStyle/>
+                    <a:p>
+                      <a:pPr algn="ctr"/>
+                      <a:r>
+                        <a:rPr lang="en-US" altLang="zh-CN" sz="1800" kern="1200" dirty="0" smtClean="0">
+                          <a:solidFill>
+                            <a:schemeClr val="dk1"/>
+                          </a:solidFill>
+                          <a:latin typeface="+mn-lt"/>
+                          <a:ea typeface="+mn-ea"/>
+                          <a:cs typeface="+mn-cs"/>
+                        </a:rPr>
+                        <a:t>0.7</a:t>
+                      </a:r>
+                      <a:endParaRPr lang="zh-CN" altLang="en-US" sz="1800" kern="1200" dirty="0">
+                        <a:solidFill>
+                          <a:schemeClr val="dk1"/>
+                        </a:solidFill>
+                        <a:latin typeface="+mn-lt"/>
+                        <a:ea typeface="+mn-ea"/>
+                        <a:cs typeface="+mn-cs"/>
+                      </a:endParaRPr>
+                    </a:p>
+                  </a:txBody>
+                  <a:tcPr/>
+                </a:tc>
+                <a:tc>
+                  <a:txBody>
+                    <a:bodyPr/>
+                    <a:lstStyle/>
+                    <a:p>
+                      <a:pPr algn="ctr" fontAlgn="ctr"/>
+                      <a:r>
+                        <a:rPr lang="en-US" altLang="zh-CN" sz="1800" kern="1200" dirty="0">
+                          <a:solidFill>
+                            <a:schemeClr val="dk1"/>
+                          </a:solidFill>
+                          <a:latin typeface="+mn-lt"/>
+                          <a:ea typeface="+mn-ea"/>
+                          <a:cs typeface="+mn-cs"/>
+                        </a:rPr>
+                        <a:t>0.921027</a:t>
+                      </a:r>
+                    </a:p>
+                  </a:txBody>
+                  <a:tcPr marL="9525" marR="9525" marT="9525" marB="0" anchor="ctr"/>
+                </a:tc>
+                <a:tc>
+                  <a:txBody>
+                    <a:bodyPr/>
+                    <a:lstStyle/>
+                    <a:p>
+                      <a:pPr algn="ctr" fontAlgn="ctr"/>
+                      <a:r>
+                        <a:rPr lang="en-US" altLang="zh-CN" sz="1800" kern="1200" dirty="0">
+                          <a:solidFill>
+                            <a:schemeClr val="dk1"/>
+                          </a:solidFill>
+                          <a:latin typeface="+mn-lt"/>
+                          <a:ea typeface="+mn-ea"/>
+                          <a:cs typeface="+mn-cs"/>
+                        </a:rPr>
+                        <a:t>0.016399</a:t>
+                      </a:r>
+                    </a:p>
+                  </a:txBody>
+                  <a:tcPr marL="9525" marR="9525" marT="9525" marB="0" anchor="ctr"/>
+                </a:tc>
+                <a:tc>
+                  <a:txBody>
+                    <a:bodyPr/>
+                    <a:lstStyle/>
+                    <a:p>
+                      <a:pPr algn="ctr" fontAlgn="ctr"/>
+                      <a:r>
+                        <a:rPr lang="en-US" altLang="zh-CN" sz="1800" kern="1200" dirty="0">
+                          <a:solidFill>
+                            <a:schemeClr val="dk1"/>
+                          </a:solidFill>
+                          <a:latin typeface="+mn-lt"/>
+                          <a:ea typeface="+mn-ea"/>
+                          <a:cs typeface="+mn-cs"/>
+                        </a:rPr>
+                        <a:t>0.884301</a:t>
+                      </a:r>
+                    </a:p>
+                  </a:txBody>
+                  <a:tcPr marL="9525" marR="9525" marT="9525" marB="0" anchor="ctr"/>
+                </a:tc>
+              </a:tr>
+              <a:tr h="326734">
+                <a:tc>
+                  <a:txBody>
+                    <a:bodyPr/>
+                    <a:lstStyle/>
+                    <a:p>
+                      <a:pPr algn="ctr"/>
+                      <a:r>
+                        <a:rPr lang="en-US" altLang="zh-CN" sz="1800" kern="1200" dirty="0" smtClean="0">
+                          <a:solidFill>
+                            <a:schemeClr val="dk1"/>
+                          </a:solidFill>
+                          <a:latin typeface="+mn-lt"/>
+                          <a:ea typeface="+mn-ea"/>
+                          <a:cs typeface="+mn-cs"/>
+                        </a:rPr>
+                        <a:t>0.8</a:t>
+                      </a:r>
+                      <a:endParaRPr lang="zh-CN" altLang="en-US" sz="1800" kern="1200" dirty="0">
+                        <a:solidFill>
+                          <a:schemeClr val="dk1"/>
+                        </a:solidFill>
+                        <a:latin typeface="+mn-lt"/>
+                        <a:ea typeface="+mn-ea"/>
+                        <a:cs typeface="+mn-cs"/>
+                      </a:endParaRPr>
+                    </a:p>
+                  </a:txBody>
+                  <a:tcPr/>
+                </a:tc>
+                <a:tc>
+                  <a:txBody>
+                    <a:bodyPr/>
+                    <a:lstStyle/>
+                    <a:p>
+                      <a:pPr algn="ctr" fontAlgn="ctr"/>
+                      <a:r>
+                        <a:rPr lang="en-US" altLang="zh-CN" sz="1800" kern="1200" dirty="0">
+                          <a:solidFill>
+                            <a:schemeClr val="dk1"/>
+                          </a:solidFill>
+                          <a:latin typeface="+mn-lt"/>
+                          <a:ea typeface="+mn-ea"/>
+                          <a:cs typeface="+mn-cs"/>
+                        </a:rPr>
+                        <a:t>0.922493</a:t>
+                      </a:r>
+                    </a:p>
+                  </a:txBody>
+                  <a:tcPr marL="9525" marR="9525" marT="9525" marB="0" anchor="ctr"/>
+                </a:tc>
+                <a:tc>
+                  <a:txBody>
+                    <a:bodyPr/>
+                    <a:lstStyle/>
+                    <a:p>
+                      <a:pPr algn="ctr" fontAlgn="ctr"/>
+                      <a:r>
+                        <a:rPr lang="en-US" altLang="zh-CN" sz="1800" kern="1200" dirty="0">
+                          <a:solidFill>
+                            <a:schemeClr val="dk1"/>
+                          </a:solidFill>
+                          <a:latin typeface="+mn-lt"/>
+                          <a:ea typeface="+mn-ea"/>
+                          <a:cs typeface="+mn-cs"/>
+                        </a:rPr>
+                        <a:t>0.014054</a:t>
+                      </a:r>
+                    </a:p>
+                  </a:txBody>
+                  <a:tcPr marL="9525" marR="9525" marT="9525" marB="0" anchor="ctr"/>
+                </a:tc>
+                <a:tc>
+                  <a:txBody>
+                    <a:bodyPr/>
+                    <a:lstStyle/>
+                    <a:p>
+                      <a:pPr algn="ctr" fontAlgn="ctr"/>
+                      <a:r>
+                        <a:rPr lang="en-US" altLang="zh-CN" sz="1800" kern="1200" dirty="0">
+                          <a:solidFill>
+                            <a:schemeClr val="dk1"/>
+                          </a:solidFill>
+                          <a:latin typeface="+mn-lt"/>
+                          <a:ea typeface="+mn-ea"/>
+                          <a:cs typeface="+mn-cs"/>
+                        </a:rPr>
+                        <a:t>0.883768</a:t>
+                      </a:r>
+                    </a:p>
+                  </a:txBody>
+                  <a:tcPr marL="9525" marR="9525" marT="9525" marB="0" anchor="ctr"/>
+                </a:tc>
+              </a:tr>
+              <a:tr h="326734">
+                <a:tc>
+                  <a:txBody>
+                    <a:bodyPr/>
+                    <a:lstStyle/>
+                    <a:p>
+                      <a:pPr algn="ctr"/>
+                      <a:r>
+                        <a:rPr lang="en-US" altLang="zh-CN" sz="1800" kern="1200" dirty="0" smtClean="0">
+                          <a:solidFill>
+                            <a:schemeClr val="dk1"/>
+                          </a:solidFill>
+                          <a:latin typeface="+mn-lt"/>
+                          <a:ea typeface="+mn-ea"/>
+                          <a:cs typeface="+mn-cs"/>
+                        </a:rPr>
+                        <a:t>0.9</a:t>
+                      </a:r>
+                      <a:endParaRPr lang="zh-CN" altLang="en-US" sz="1800" kern="1200" dirty="0">
+                        <a:solidFill>
+                          <a:schemeClr val="dk1"/>
+                        </a:solidFill>
+                        <a:latin typeface="+mn-lt"/>
+                        <a:ea typeface="+mn-ea"/>
+                        <a:cs typeface="+mn-cs"/>
+                      </a:endParaRPr>
+                    </a:p>
+                  </a:txBody>
+                  <a:tcPr/>
+                </a:tc>
+                <a:tc>
+                  <a:txBody>
+                    <a:bodyPr/>
+                    <a:lstStyle/>
+                    <a:p>
+                      <a:pPr algn="ctr" fontAlgn="ctr"/>
+                      <a:r>
+                        <a:rPr lang="en-US" altLang="zh-CN" sz="1800" kern="1200" dirty="0">
+                          <a:solidFill>
+                            <a:schemeClr val="dk1"/>
+                          </a:solidFill>
+                          <a:latin typeface="+mn-lt"/>
+                          <a:ea typeface="+mn-ea"/>
+                          <a:cs typeface="+mn-cs"/>
+                        </a:rPr>
+                        <a:t>0.923869</a:t>
+                      </a:r>
+                    </a:p>
+                  </a:txBody>
+                  <a:tcPr marL="9525" marR="9525" marT="9525" marB="0" anchor="ctr"/>
+                </a:tc>
+                <a:tc>
+                  <a:txBody>
+                    <a:bodyPr/>
+                    <a:lstStyle/>
+                    <a:p>
+                      <a:pPr algn="ctr" fontAlgn="ctr"/>
+                      <a:r>
+                        <a:rPr lang="en-US" altLang="zh-CN" sz="1800" kern="1200" dirty="0">
+                          <a:solidFill>
+                            <a:schemeClr val="dk1"/>
+                          </a:solidFill>
+                          <a:latin typeface="+mn-lt"/>
+                          <a:ea typeface="+mn-ea"/>
+                          <a:cs typeface="+mn-cs"/>
+                        </a:rPr>
+                        <a:t>0.013094</a:t>
+                      </a:r>
+                    </a:p>
+                  </a:txBody>
+                  <a:tcPr marL="9525" marR="9525" marT="9525" marB="0" anchor="ctr"/>
+                </a:tc>
+                <a:tc>
+                  <a:txBody>
+                    <a:bodyPr/>
+                    <a:lstStyle/>
+                    <a:p>
+                      <a:pPr algn="ctr" fontAlgn="ctr"/>
+                      <a:r>
+                        <a:rPr lang="en-US" altLang="zh-CN" sz="1800" kern="1200" dirty="0">
+                          <a:solidFill>
+                            <a:schemeClr val="dk1"/>
+                          </a:solidFill>
+                          <a:latin typeface="+mn-lt"/>
+                          <a:ea typeface="+mn-ea"/>
+                          <a:cs typeface="+mn-cs"/>
+                        </a:rPr>
+                        <a:t>0.883197</a:t>
+                      </a:r>
+                    </a:p>
+                  </a:txBody>
+                  <a:tcPr marL="9525" marR="9525" marT="9525" marB="0" anchor="ctr"/>
+                </a:tc>
+              </a:tr>
+              <a:tr h="326734">
+                <a:tc>
+                  <a:txBody>
+                    <a:bodyPr/>
+                    <a:lstStyle/>
+                    <a:p>
+                      <a:pPr algn="ctr"/>
+                      <a:r>
+                        <a:rPr lang="en-US" altLang="zh-CN" sz="1800" kern="1200" dirty="0" smtClean="0">
+                          <a:solidFill>
+                            <a:schemeClr val="dk1"/>
+                          </a:solidFill>
+                          <a:latin typeface="+mn-lt"/>
+                          <a:ea typeface="+mn-ea"/>
+                          <a:cs typeface="+mn-cs"/>
+                        </a:rPr>
+                        <a:t>1.0</a:t>
+                      </a:r>
+                      <a:endParaRPr lang="zh-CN" altLang="en-US" sz="1800" kern="1200" dirty="0">
+                        <a:solidFill>
+                          <a:schemeClr val="dk1"/>
+                        </a:solidFill>
+                        <a:latin typeface="+mn-lt"/>
+                        <a:ea typeface="+mn-ea"/>
+                        <a:cs typeface="+mn-cs"/>
+                      </a:endParaRPr>
+                    </a:p>
+                  </a:txBody>
+                  <a:tcPr/>
+                </a:tc>
+                <a:tc>
+                  <a:txBody>
+                    <a:bodyPr/>
+                    <a:lstStyle/>
+                    <a:p>
+                      <a:pPr algn="ctr" fontAlgn="ctr"/>
+                      <a:r>
+                        <a:rPr lang="en-US" altLang="zh-CN" sz="1800" kern="1200" dirty="0">
+                          <a:solidFill>
+                            <a:schemeClr val="dk1"/>
+                          </a:solidFill>
+                          <a:latin typeface="+mn-lt"/>
+                          <a:ea typeface="+mn-ea"/>
+                          <a:cs typeface="+mn-cs"/>
+                        </a:rPr>
+                        <a:t>0.925163</a:t>
+                      </a:r>
+                    </a:p>
+                  </a:txBody>
+                  <a:tcPr marL="9525" marR="9525" marT="9525" marB="0" anchor="ctr"/>
+                </a:tc>
+                <a:tc>
+                  <a:txBody>
+                    <a:bodyPr/>
+                    <a:lstStyle/>
+                    <a:p>
+                      <a:pPr algn="ctr" fontAlgn="ctr"/>
+                      <a:r>
+                        <a:rPr lang="en-US" altLang="zh-CN" sz="1800" kern="1200" dirty="0">
+                          <a:solidFill>
+                            <a:schemeClr val="dk1"/>
+                          </a:solidFill>
+                          <a:latin typeface="+mn-lt"/>
+                          <a:ea typeface="+mn-ea"/>
+                          <a:cs typeface="+mn-cs"/>
+                        </a:rPr>
+                        <a:t>0.012257</a:t>
+                      </a:r>
+                    </a:p>
+                  </a:txBody>
+                  <a:tcPr marL="9525" marR="9525" marT="9525" marB="0" anchor="ctr"/>
+                </a:tc>
+                <a:tc>
+                  <a:txBody>
+                    <a:bodyPr/>
+                    <a:lstStyle/>
+                    <a:p>
+                      <a:pPr algn="ctr" fontAlgn="ctr"/>
+                      <a:r>
+                        <a:rPr lang="en-US" altLang="zh-CN" sz="1800" kern="1200" dirty="0">
+                          <a:solidFill>
+                            <a:schemeClr val="dk1"/>
+                          </a:solidFill>
+                          <a:latin typeface="+mn-lt"/>
+                          <a:ea typeface="+mn-ea"/>
+                          <a:cs typeface="+mn-cs"/>
+                        </a:rPr>
+                        <a:t>0.882596</a:t>
+                      </a:r>
+                    </a:p>
+                  </a:txBody>
+                  <a:tcPr marL="9525" marR="9525" marT="9525" marB="0" anchor="ctr"/>
+                </a:tc>
+              </a:tr>
+            </a:tbl>
+          </a:graphicData>
+        </a:graphic>
+      </p:graphicFrame>
+    </p:spTree>
+    <p:extLst>
+      <p:ext uri="{BB962C8B-B14F-4D97-AF65-F5344CB8AC3E}">
+        <p14:creationId xmlns:p14="http://schemas.microsoft.com/office/powerpoint/2010/main" val="1938492345"/>
+      </p:ext>
+    </p:extLst>
+  </p:cSld>
+  <p:clrMapOvr>
+    <a:masterClrMapping/>
+  </p:clrMapOvr>
+  <p:timing>
+    <p:tnLst>
+      <p:par>
+        <p:cTn id="1" dur="indefinite" restart="never" nodeType="tmRoot"/>
+      </p:par>
+    </p:tnLst>
+  </p:timing>
+</p:sld>
+</file>
+
+<file path=ppt/slides/slide11.xml><?xml version="1.0" encoding="utf-8"?>
+<p:sld xmlns:a="http://schemas.openxmlformats.org/drawingml/2006/main" xmlns:r="http://schemas.openxmlformats.org/officeDocument/2006/relationships" xmlns:p="http://schemas.openxmlformats.org/presentationml/2006/main">
+  <p:cSld>
+    <p:spTree>
+      <p:nvGrpSpPr>
+        <p:cNvPr id="1" name=""/>
+        <p:cNvGrpSpPr/>
+        <p:nvPr/>
+      </p:nvGrpSpPr>
+      <p:grpSpPr>
+        <a:xfrm>
+          <a:off x="0" y="0"/>
+          <a:ext cx="0" cy="0"/>
+          <a:chOff x="0" y="0"/>
+          <a:chExt cx="0" cy="0"/>
+        </a:xfrm>
+      </p:grpSpPr>
+      <p:sp>
+        <p:nvSpPr>
           <p:cNvPr id="4" name="TextBox 3"/>
           <p:cNvSpPr txBox="1"/>
           <p:nvPr/>
@@ -6996,11 +7995,7 @@
             </a:r>
             <a:r>
               <a:rPr lang="en-US" altLang="zh-CN" dirty="0" smtClean="0"/>
-              <a:t>: </a:t>
-            </a:r>
-            <a:r>
-              <a:rPr lang="en-US" altLang="zh-CN" dirty="0" smtClean="0"/>
-              <a:t>Whether this pixel is possible to be Mineral-X</a:t>
+              <a:t>: Whether this pixel is possible to be Mineral-X</a:t>
             </a:r>
             <a:endParaRPr lang="zh-CN" altLang="en-US" dirty="0"/>
           </a:p>
@@ -7411,11 +8406,7 @@
             </a:r>
             <a:r>
               <a:rPr lang="en-US" altLang="zh-CN" dirty="0" smtClean="0"/>
-              <a:t>: </a:t>
-            </a:r>
-            <a:r>
-              <a:rPr lang="en-US" altLang="zh-CN" dirty="0" smtClean="0"/>
-              <a:t>Whether this pixel is possible to be Mineral-X</a:t>
+              <a:t>: Whether this pixel is possible to be Mineral-X</a:t>
             </a:r>
             <a:endParaRPr lang="zh-CN" altLang="en-US" dirty="0"/>
           </a:p>
@@ -7484,9 +8475,109 @@
           </a:fontRef>
         </p:style>
       </p:cxnSp>
+      <p:cxnSp>
+        <p:nvCxnSpPr>
+          <p:cNvPr id="19" name="Straight Arrow Connector 18"/>
+          <p:cNvCxnSpPr/>
+          <p:nvPr/>
+        </p:nvCxnSpPr>
+        <p:spPr>
+          <a:xfrm flipV="1">
+            <a:off x="7703063" y="1845276"/>
+            <a:ext cx="1078472" cy="436605"/>
+          </a:xfrm>
+          <a:prstGeom prst="straightConnector1">
+            <a:avLst/>
+          </a:prstGeom>
+          <a:ln>
+            <a:tailEnd type="triangle"/>
+          </a:ln>
+        </p:spPr>
+        <p:style>
+          <a:lnRef idx="1">
+            <a:schemeClr val="accent1"/>
+          </a:lnRef>
+          <a:fillRef idx="0">
+            <a:schemeClr val="accent1"/>
+          </a:fillRef>
+          <a:effectRef idx="0">
+            <a:schemeClr val="accent1"/>
+          </a:effectRef>
+          <a:fontRef idx="minor">
+            <a:schemeClr val="tx1"/>
+          </a:fontRef>
+        </p:style>
+      </p:cxnSp>
+      <p:sp>
+        <p:nvSpPr>
+          <p:cNvPr id="20" name="TextBox 19"/>
+          <p:cNvSpPr txBox="1"/>
+          <p:nvPr/>
+        </p:nvSpPr>
+        <p:spPr>
+          <a:xfrm>
+            <a:off x="8843153" y="1616073"/>
+            <a:ext cx="2651688" cy="369332"/>
+          </a:xfrm>
+          <a:prstGeom prst="rect">
+            <a:avLst/>
+          </a:prstGeom>
+          <a:noFill/>
+        </p:spPr>
+        <p:txBody>
+          <a:bodyPr wrap="none" rtlCol="0">
+            <a:spAutoFit/>
+          </a:bodyPr>
+          <a:lstStyle/>
+          <a:p>
+            <a:r>
+              <a:rPr lang="en-US" altLang="zh-CN" dirty="0" smtClean="0">
+                <a:solidFill>
+                  <a:srgbClr val="0070C0"/>
+                </a:solidFill>
+              </a:rPr>
+              <a:t>Now use 0.0075(DT’s Test)</a:t>
+            </a:r>
+            <a:endParaRPr lang="zh-CN" altLang="en-US" dirty="0">
+              <a:solidFill>
+                <a:srgbClr val="0070C0"/>
+              </a:solidFill>
+            </a:endParaRPr>
+          </a:p>
+        </p:txBody>
+      </p:sp>
+      <p:sp>
+        <p:nvSpPr>
+          <p:cNvPr id="21" name="TextBox 20"/>
+          <p:cNvSpPr txBox="1"/>
+          <p:nvPr/>
+        </p:nvSpPr>
+        <p:spPr>
+          <a:xfrm>
+            <a:off x="7703063" y="5697974"/>
+            <a:ext cx="1642116" cy="307777"/>
+          </a:xfrm>
+          <a:prstGeom prst="rect">
+            <a:avLst/>
+          </a:prstGeom>
+          <a:noFill/>
+        </p:spPr>
+        <p:txBody>
+          <a:bodyPr wrap="none" rtlCol="0">
+            <a:spAutoFit/>
+          </a:bodyPr>
+          <a:lstStyle/>
+          <a:p>
+            <a:r>
+              <a:rPr lang="en-US" altLang="zh-CN" sz="1400" dirty="0" smtClean="0"/>
+              <a:t>Around: 740 +- 2nm</a:t>
+            </a:r>
+          </a:p>
+        </p:txBody>
+      </p:sp>
       <p:pic>
         <p:nvPicPr>
-          <p:cNvPr id="12" name="Picture 11"/>
+          <p:cNvPr id="2" name="Picture 1"/>
           <p:cNvPicPr>
             <a:picLocks noChangeAspect="1"/>
           </p:cNvPicPr>
@@ -7506,8 +8597,8 @@
         </p:blipFill>
         <p:spPr>
           <a:xfrm>
-            <a:off x="6001383" y="2463191"/>
-            <a:ext cx="4537171" cy="3402878"/>
+            <a:off x="5971816" y="2259659"/>
+            <a:ext cx="4563112" cy="3410426"/>
           </a:xfrm>
           <a:prstGeom prst="rect">
             <a:avLst/>
@@ -7516,14 +8607,14 @@
       </p:pic>
       <p:sp>
         <p:nvSpPr>
-          <p:cNvPr id="13" name="TextBox 12"/>
+          <p:cNvPr id="18" name="TextBox 17"/>
           <p:cNvSpPr txBox="1"/>
           <p:nvPr/>
         </p:nvSpPr>
         <p:spPr>
           <a:xfrm>
-            <a:off x="7703063" y="4736757"/>
-            <a:ext cx="540533" cy="307777"/>
+            <a:off x="7880701" y="4208771"/>
+            <a:ext cx="404278" cy="307777"/>
           </a:xfrm>
           <a:prstGeom prst="rect">
             <a:avLst/>
@@ -7538,20 +8629,21 @@
           <a:p>
             <a:r>
               <a:rPr lang="en-US" altLang="zh-CN" sz="1400" dirty="0" smtClean="0"/>
-              <a:t>2.5%</a:t>
-            </a:r>
+              <a:t>2%</a:t>
+            </a:r>
+            <a:endParaRPr lang="en-US" altLang="zh-CN" sz="1400" dirty="0" smtClean="0"/>
           </a:p>
         </p:txBody>
       </p:sp>
       <p:sp>
         <p:nvSpPr>
-          <p:cNvPr id="14" name="TextBox 13"/>
+          <p:cNvPr id="22" name="TextBox 21"/>
           <p:cNvSpPr txBox="1"/>
           <p:nvPr/>
         </p:nvSpPr>
         <p:spPr>
           <a:xfrm>
-            <a:off x="8185257" y="5125039"/>
+            <a:off x="8500647" y="5189288"/>
             <a:ext cx="495649" cy="307777"/>
           </a:xfrm>
           <a:prstGeom prst="rect">
@@ -7574,14 +8666,14 @@
       </p:sp>
       <p:sp>
         <p:nvSpPr>
-          <p:cNvPr id="15" name="TextBox 12"/>
+          <p:cNvPr id="23" name="TextBox 12"/>
           <p:cNvSpPr txBox="1"/>
           <p:nvPr/>
         </p:nvSpPr>
         <p:spPr>
           <a:xfrm>
-            <a:off x="8433290" y="4537897"/>
-            <a:ext cx="540533" cy="307777"/>
+            <a:off x="8939542" y="4362659"/>
+            <a:ext cx="404278" cy="307777"/>
           </a:xfrm>
           <a:prstGeom prst="rect">
             <a:avLst/>
@@ -7690,21 +8782,22 @@
           <a:p>
             <a:r>
               <a:rPr lang="en-US" altLang="zh-CN" sz="1400" dirty="0" smtClean="0"/>
-              <a:t>2.5%</a:t>
-            </a:r>
+              <a:t>2%</a:t>
+            </a:r>
+            <a:endParaRPr lang="en-US" altLang="zh-CN" sz="1400" dirty="0" smtClean="0"/>
           </a:p>
         </p:txBody>
       </p:sp>
       <p:sp>
         <p:nvSpPr>
-          <p:cNvPr id="16" name="TextBox 12"/>
+          <p:cNvPr id="24" name="TextBox 12"/>
           <p:cNvSpPr txBox="1"/>
           <p:nvPr/>
         </p:nvSpPr>
         <p:spPr>
           <a:xfrm>
-            <a:off x="8703556" y="4230120"/>
-            <a:ext cx="540533" cy="307777"/>
+            <a:off x="9560532" y="3472701"/>
+            <a:ext cx="404278" cy="307777"/>
           </a:xfrm>
           <a:prstGeom prst="rect">
             <a:avLst/>
@@ -7813,21 +8906,22 @@
           <a:p>
             <a:r>
               <a:rPr lang="en-US" altLang="zh-CN" sz="1400" dirty="0" smtClean="0"/>
-              <a:t>2.5%</a:t>
-            </a:r>
+              <a:t>2%</a:t>
+            </a:r>
+            <a:endParaRPr lang="en-US" altLang="zh-CN" sz="1400" dirty="0" smtClean="0"/>
           </a:p>
         </p:txBody>
       </p:sp>
       <p:sp>
         <p:nvSpPr>
-          <p:cNvPr id="17" name="TextBox 12"/>
+          <p:cNvPr id="25" name="TextBox 12"/>
           <p:cNvSpPr txBox="1"/>
           <p:nvPr/>
         </p:nvSpPr>
         <p:spPr>
           <a:xfrm>
-            <a:off x="8997526" y="3530485"/>
-            <a:ext cx="540533" cy="307777"/>
+            <a:off x="9329469" y="3732126"/>
+            <a:ext cx="404278" cy="307777"/>
           </a:xfrm>
           <a:prstGeom prst="rect">
             <a:avLst/>
@@ -7936,54 +9030,22 @@
           <a:p>
             <a:r>
               <a:rPr lang="en-US" altLang="zh-CN" sz="1400" dirty="0" smtClean="0"/>
-              <a:t>2.5%</a:t>
-            </a:r>
+              <a:t>2%</a:t>
+            </a:r>
+            <a:endParaRPr lang="en-US" altLang="zh-CN" sz="1400" dirty="0" smtClean="0"/>
           </a:p>
         </p:txBody>
       </p:sp>
-      <p:cxnSp>
-        <p:nvCxnSpPr>
-          <p:cNvPr id="19" name="Straight Arrow Connector 18"/>
-          <p:cNvCxnSpPr/>
-          <p:nvPr/>
-        </p:nvCxnSpPr>
-        <p:spPr>
-          <a:xfrm flipV="1">
-            <a:off x="7703063" y="1845276"/>
-            <a:ext cx="1078472" cy="436605"/>
-          </a:xfrm>
-          <a:prstGeom prst="straightConnector1">
-            <a:avLst/>
-          </a:prstGeom>
-          <a:ln>
-            <a:tailEnd type="triangle"/>
-          </a:ln>
-        </p:spPr>
-        <p:style>
-          <a:lnRef idx="1">
-            <a:schemeClr val="accent1"/>
-          </a:lnRef>
-          <a:fillRef idx="0">
-            <a:schemeClr val="accent1"/>
-          </a:fillRef>
-          <a:effectRef idx="0">
-            <a:schemeClr val="accent1"/>
-          </a:effectRef>
-          <a:fontRef idx="minor">
-            <a:schemeClr val="tx1"/>
-          </a:fontRef>
-        </p:style>
-      </p:cxnSp>
       <p:sp>
         <p:nvSpPr>
-          <p:cNvPr id="20" name="TextBox 19"/>
+          <p:cNvPr id="26" name="TextBox 25"/>
           <p:cNvSpPr txBox="1"/>
           <p:nvPr/>
         </p:nvSpPr>
         <p:spPr>
           <a:xfrm>
-            <a:off x="8843153" y="1616073"/>
-            <a:ext cx="2651688" cy="369332"/>
+            <a:off x="8253001" y="4748790"/>
+            <a:ext cx="404278" cy="307777"/>
           </a:xfrm>
           <a:prstGeom prst="rect">
             <a:avLst/>
@@ -7997,54 +9059,17 @@
           <a:lstStyle/>
           <a:p>
             <a:r>
-              <a:rPr lang="en-US" altLang="zh-CN" dirty="0" smtClean="0">
-                <a:solidFill>
-                  <a:srgbClr val="0070C0"/>
-                </a:solidFill>
-              </a:rPr>
-              <a:t>Now use 0.0075(DT’s Test)</a:t>
-            </a:r>
-            <a:endParaRPr lang="zh-CN" altLang="en-US" dirty="0">
-              <a:solidFill>
-                <a:srgbClr val="0070C0"/>
-              </a:solidFill>
-            </a:endParaRPr>
-          </a:p>
-        </p:txBody>
-      </p:sp>
-      <p:sp>
-        <p:nvSpPr>
-          <p:cNvPr id="21" name="TextBox 20"/>
-          <p:cNvSpPr txBox="1"/>
-          <p:nvPr/>
-        </p:nvSpPr>
-        <p:spPr>
-          <a:xfrm>
-            <a:off x="7703063" y="5697974"/>
-            <a:ext cx="1642116" cy="307777"/>
-          </a:xfrm>
-          <a:prstGeom prst="rect">
-            <a:avLst/>
-          </a:prstGeom>
-          <a:noFill/>
-        </p:spPr>
-        <p:txBody>
-          <a:bodyPr wrap="none" rtlCol="0">
-            <a:spAutoFit/>
-          </a:bodyPr>
-          <a:lstStyle/>
-          <a:p>
-            <a:r>
               <a:rPr lang="en-US" altLang="zh-CN" sz="1400" dirty="0" smtClean="0"/>
-              <a:t>Around: 740 +- 2nm</a:t>
-            </a:r>
+              <a:t>2%</a:t>
+            </a:r>
+            <a:endParaRPr lang="en-US" altLang="zh-CN" sz="1400" dirty="0" smtClean="0"/>
           </a:p>
         </p:txBody>
       </p:sp>
     </p:spTree>
     <p:extLst>
       <p:ext uri="{BB962C8B-B14F-4D97-AF65-F5344CB8AC3E}">
-        <p14:creationId xmlns:p14="http://schemas.microsoft.com/office/powerpoint/2010/main" val="3255255020"/>
+        <p14:creationId xmlns:p14="http://schemas.microsoft.com/office/powerpoint/2010/main" val="2662833778"/>
       </p:ext>
     </p:extLst>
   </p:cSld>
@@ -8072,7 +9097,7 @@
                             </p:stCondLst>
                             <p:childTnLst>
                               <p:par>
-                                <p:cTn id="5" presetID="10" presetClass="entr" presetSubtype="0" fill="hold" nodeType="clickEffect">
+                                <p:cTn id="5" presetID="10" presetClass="entr" presetSubtype="0" fill="hold" grpId="0" nodeType="clickEffect">
                                   <p:stCondLst>
                                     <p:cond delay="0"/>
                                   </p:stCondLst>
@@ -8085,7 +9110,7 @@
                                           </p:stCondLst>
                                         </p:cTn>
                                         <p:tgtEl>
-                                          <p:spTgt spid="12"/>
+                                          <p:spTgt spid="23"/>
                                         </p:tgtEl>
                                         <p:attrNameLst>
                                           <p:attrName>style.visibility</p:attrName>
@@ -8099,7 +9124,7 @@
                                       <p:cBhvr>
                                         <p:cTn id="7" dur="500"/>
                                         <p:tgtEl>
-                                          <p:spTgt spid="12"/>
+                                          <p:spTgt spid="23"/>
                                         </p:tgtEl>
                                       </p:cBhvr>
                                     </p:animEffect>
@@ -8120,7 +9145,7 @@
                                           </p:stCondLst>
                                         </p:cTn>
                                         <p:tgtEl>
-                                          <p:spTgt spid="17"/>
+                                          <p:spTgt spid="25"/>
                                         </p:tgtEl>
                                         <p:attrNameLst>
                                           <p:attrName>style.visibility</p:attrName>
@@ -8134,7 +9159,7 @@
                                       <p:cBhvr>
                                         <p:cTn id="10" dur="500"/>
                                         <p:tgtEl>
-                                          <p:spTgt spid="17"/>
+                                          <p:spTgt spid="25"/>
                                         </p:tgtEl>
                                       </p:cBhvr>
                                     </p:animEffect>
@@ -8155,7 +9180,7 @@
                                           </p:stCondLst>
                                         </p:cTn>
                                         <p:tgtEl>
-                                          <p:spTgt spid="16"/>
+                                          <p:spTgt spid="24"/>
                                         </p:tgtEl>
                                         <p:attrNameLst>
                                           <p:attrName>style.visibility</p:attrName>
@@ -8169,7 +9194,7 @@
                                       <p:cBhvr>
                                         <p:cTn id="13" dur="500"/>
                                         <p:tgtEl>
-                                          <p:spTgt spid="16"/>
+                                          <p:spTgt spid="24"/>
                                         </p:tgtEl>
                                       </p:cBhvr>
                                     </p:animEffect>
@@ -8190,7 +9215,7 @@
                                           </p:stCondLst>
                                         </p:cTn>
                                         <p:tgtEl>
-                                          <p:spTgt spid="15"/>
+                                          <p:spTgt spid="22"/>
                                         </p:tgtEl>
                                         <p:attrNameLst>
                                           <p:attrName>style.visibility</p:attrName>
@@ -8204,7 +9229,7 @@
                                       <p:cBhvr>
                                         <p:cTn id="16" dur="500"/>
                                         <p:tgtEl>
-                                          <p:spTgt spid="15"/>
+                                          <p:spTgt spid="22"/>
                                         </p:tgtEl>
                                       </p:cBhvr>
                                     </p:animEffect>
@@ -8225,7 +9250,7 @@
                                           </p:stCondLst>
                                         </p:cTn>
                                         <p:tgtEl>
-                                          <p:spTgt spid="14"/>
+                                          <p:spTgt spid="26"/>
                                         </p:tgtEl>
                                         <p:attrNameLst>
                                           <p:attrName>style.visibility</p:attrName>
@@ -8239,7 +9264,7 @@
                                       <p:cBhvr>
                                         <p:cTn id="19" dur="500"/>
                                         <p:tgtEl>
-                                          <p:spTgt spid="14"/>
+                                          <p:spTgt spid="26"/>
                                         </p:tgtEl>
                                       </p:cBhvr>
                                     </p:animEffect>
@@ -8260,7 +9285,7 @@
                                           </p:stCondLst>
                                         </p:cTn>
                                         <p:tgtEl>
-                                          <p:spTgt spid="13"/>
+                                          <p:spTgt spid="18"/>
                                         </p:tgtEl>
                                         <p:attrNameLst>
                                           <p:attrName>style.visibility</p:attrName>
@@ -8274,7 +9299,7 @@
                                       <p:cBhvr>
                                         <p:cTn id="22" dur="500"/>
                                         <p:tgtEl>
-                                          <p:spTgt spid="13"/>
+                                          <p:spTgt spid="18"/>
                                         </p:tgtEl>
                                       </p:cBhvr>
                                     </p:animEffect>
@@ -8282,7 +9307,7 @@
                                 </p:cTn>
                               </p:par>
                               <p:par>
-                                <p:cTn id="23" presetID="10" presetClass="entr" presetSubtype="0" fill="hold" grpId="0" nodeType="withEffect">
+                                <p:cTn id="23" presetID="10" presetClass="entr" presetSubtype="0" fill="hold" nodeType="withEffect">
                                   <p:stCondLst>
                                     <p:cond delay="0"/>
                                   </p:stCondLst>
@@ -8290,6 +9315,41 @@
                                     <p:set>
                                       <p:cBhvr>
                                         <p:cTn id="24" dur="1" fill="hold">
+                                          <p:stCondLst>
+                                            <p:cond delay="0"/>
+                                          </p:stCondLst>
+                                        </p:cTn>
+                                        <p:tgtEl>
+                                          <p:spTgt spid="2"/>
+                                        </p:tgtEl>
+                                        <p:attrNameLst>
+                                          <p:attrName>style.visibility</p:attrName>
+                                        </p:attrNameLst>
+                                      </p:cBhvr>
+                                      <p:to>
+                                        <p:strVal val="visible"/>
+                                      </p:to>
+                                    </p:set>
+                                    <p:animEffect transition="in" filter="fade">
+                                      <p:cBhvr>
+                                        <p:cTn id="25" dur="500"/>
+                                        <p:tgtEl>
+                                          <p:spTgt spid="2"/>
+                                        </p:tgtEl>
+                                      </p:cBhvr>
+                                    </p:animEffect>
+                                  </p:childTnLst>
+                                </p:cTn>
+                              </p:par>
+                              <p:par>
+                                <p:cTn id="26" presetID="10" presetClass="entr" presetSubtype="0" fill="hold" grpId="0" nodeType="withEffect">
+                                  <p:stCondLst>
+                                    <p:cond delay="0"/>
+                                  </p:stCondLst>
+                                  <p:childTnLst>
+                                    <p:set>
+                                      <p:cBhvr>
+                                        <p:cTn id="27" dur="1" fill="hold">
                                           <p:stCondLst>
                                             <p:cond delay="0"/>
                                           </p:stCondLst>
@@ -8307,7 +9367,7 @@
                                     </p:set>
                                     <p:animEffect transition="in" filter="fade">
                                       <p:cBhvr>
-                                        <p:cTn id="25" dur="500"/>
+                                        <p:cTn id="28" dur="500"/>
                                         <p:tgtEl>
                                           <p:spTgt spid="21"/>
                                         </p:tgtEl>
@@ -8344,12 +9404,13 @@
       </p:par>
     </p:tnLst>
     <p:bldLst>
-      <p:bldP spid="13" grpId="0"/>
-      <p:bldP spid="14" grpId="0"/>
-      <p:bldP spid="15" grpId="0"/>
-      <p:bldP spid="16" grpId="0"/>
-      <p:bldP spid="17" grpId="0"/>
       <p:bldP spid="21" grpId="0"/>
+      <p:bldP spid="18" grpId="0"/>
+      <p:bldP spid="22" grpId="0"/>
+      <p:bldP spid="23" grpId="0"/>
+      <p:bldP spid="24" grpId="0"/>
+      <p:bldP spid="25" grpId="0"/>
+      <p:bldP spid="26" grpId="0"/>
     </p:bldLst>
   </p:timing>
 </p:sld>
@@ -9694,7 +10755,6 @@
               <a:rPr lang="en-US" altLang="zh-CN" dirty="0" smtClean="0"/>
               <a:t>)</a:t>
             </a:r>
-            <a:endParaRPr lang="en-US" altLang="zh-CN" dirty="0" smtClean="0"/>
           </a:p>
           <a:p>
             <a:r>

</xml_diff>